<commit_message>
feat(experiement1B): added composite model, feature selection and shapely
</commit_message>
<xml_diff>
--- a/docs/project_visuals.pptx
+++ b/docs/project_visuals.pptx
@@ -6,6 +6,7 @@
   </p:sldMasterIdLst>
   <p:sldIdLst>
     <p:sldId id="256" r:id="rId2"/>
+    <p:sldId id="257" r:id="rId3"/>
   </p:sldIdLst>
   <p:sldSz cx="12192000" cy="6858000"/>
   <p:notesSz cx="6858000" cy="9144000"/>
@@ -104,6 +105,11 @@
       </a:defRPr>
     </a:lvl9pPr>
   </p:defaultTextStyle>
+  <p:extLst>
+    <p:ext uri="{EFAFB233-063F-42B5-8137-9DF3F51BA10A}">
+      <p15:sldGuideLst xmlns:p15="http://schemas.microsoft.com/office/powerpoint/2012/main"/>
+    </p:ext>
+  </p:extLst>
 </p:presentation>
 </file>
 
@@ -256,7 +262,7 @@
           <a:p>
             <a:fld id="{D290263C-F0B7-4978-9DF5-9831B9BD4CAD}" type="datetimeFigureOut">
               <a:rPr lang="en-IN" smtClean="0"/>
-              <a:t>22-04-2024</a:t>
+              <a:t>15-05-2024</a:t>
             </a:fld>
             <a:endParaRPr lang="en-IN"/>
           </a:p>
@@ -456,7 +462,7 @@
           <a:p>
             <a:fld id="{D290263C-F0B7-4978-9DF5-9831B9BD4CAD}" type="datetimeFigureOut">
               <a:rPr lang="en-IN" smtClean="0"/>
-              <a:t>22-04-2024</a:t>
+              <a:t>15-05-2024</a:t>
             </a:fld>
             <a:endParaRPr lang="en-IN"/>
           </a:p>
@@ -666,7 +672,7 @@
           <a:p>
             <a:fld id="{D290263C-F0B7-4978-9DF5-9831B9BD4CAD}" type="datetimeFigureOut">
               <a:rPr lang="en-IN" smtClean="0"/>
-              <a:t>22-04-2024</a:t>
+              <a:t>15-05-2024</a:t>
             </a:fld>
             <a:endParaRPr lang="en-IN"/>
           </a:p>
@@ -866,7 +872,7 @@
           <a:p>
             <a:fld id="{D290263C-F0B7-4978-9DF5-9831B9BD4CAD}" type="datetimeFigureOut">
               <a:rPr lang="en-IN" smtClean="0"/>
-              <a:t>22-04-2024</a:t>
+              <a:t>15-05-2024</a:t>
             </a:fld>
             <a:endParaRPr lang="en-IN"/>
           </a:p>
@@ -1142,7 +1148,7 @@
           <a:p>
             <a:fld id="{D290263C-F0B7-4978-9DF5-9831B9BD4CAD}" type="datetimeFigureOut">
               <a:rPr lang="en-IN" smtClean="0"/>
-              <a:t>22-04-2024</a:t>
+              <a:t>15-05-2024</a:t>
             </a:fld>
             <a:endParaRPr lang="en-IN"/>
           </a:p>
@@ -1410,7 +1416,7 @@
           <a:p>
             <a:fld id="{D290263C-F0B7-4978-9DF5-9831B9BD4CAD}" type="datetimeFigureOut">
               <a:rPr lang="en-IN" smtClean="0"/>
-              <a:t>22-04-2024</a:t>
+              <a:t>15-05-2024</a:t>
             </a:fld>
             <a:endParaRPr lang="en-IN"/>
           </a:p>
@@ -1825,7 +1831,7 @@
           <a:p>
             <a:fld id="{D290263C-F0B7-4978-9DF5-9831B9BD4CAD}" type="datetimeFigureOut">
               <a:rPr lang="en-IN" smtClean="0"/>
-              <a:t>22-04-2024</a:t>
+              <a:t>15-05-2024</a:t>
             </a:fld>
             <a:endParaRPr lang="en-IN"/>
           </a:p>
@@ -1967,7 +1973,7 @@
           <a:p>
             <a:fld id="{D290263C-F0B7-4978-9DF5-9831B9BD4CAD}" type="datetimeFigureOut">
               <a:rPr lang="en-IN" smtClean="0"/>
-              <a:t>22-04-2024</a:t>
+              <a:t>15-05-2024</a:t>
             </a:fld>
             <a:endParaRPr lang="en-IN"/>
           </a:p>
@@ -2080,7 +2086,7 @@
           <a:p>
             <a:fld id="{D290263C-F0B7-4978-9DF5-9831B9BD4CAD}" type="datetimeFigureOut">
               <a:rPr lang="en-IN" smtClean="0"/>
-              <a:t>22-04-2024</a:t>
+              <a:t>15-05-2024</a:t>
             </a:fld>
             <a:endParaRPr lang="en-IN"/>
           </a:p>
@@ -2393,7 +2399,7 @@
           <a:p>
             <a:fld id="{D290263C-F0B7-4978-9DF5-9831B9BD4CAD}" type="datetimeFigureOut">
               <a:rPr lang="en-IN" smtClean="0"/>
-              <a:t>22-04-2024</a:t>
+              <a:t>15-05-2024</a:t>
             </a:fld>
             <a:endParaRPr lang="en-IN"/>
           </a:p>
@@ -2682,7 +2688,7 @@
           <a:p>
             <a:fld id="{D290263C-F0B7-4978-9DF5-9831B9BD4CAD}" type="datetimeFigureOut">
               <a:rPr lang="en-IN" smtClean="0"/>
-              <a:t>22-04-2024</a:t>
+              <a:t>15-05-2024</a:t>
             </a:fld>
             <a:endParaRPr lang="en-IN"/>
           </a:p>
@@ -2925,7 +2931,7 @@
           <a:p>
             <a:fld id="{D290263C-F0B7-4978-9DF5-9831B9BD4CAD}" type="datetimeFigureOut">
               <a:rPr lang="en-IN" smtClean="0"/>
-              <a:t>22-04-2024</a:t>
+              <a:t>15-05-2024</a:t>
             </a:fld>
             <a:endParaRPr lang="en-IN"/>
           </a:p>
@@ -5032,6 +5038,1108 @@
 </p:sld>
 </file>
 
+<file path=ppt/slides/slide2.xml><?xml version="1.0" encoding="utf-8"?>
+<p:sld xmlns:a="http://schemas.openxmlformats.org/drawingml/2006/main" xmlns:r="http://schemas.openxmlformats.org/officeDocument/2006/relationships" xmlns:p="http://schemas.openxmlformats.org/presentationml/2006/main">
+  <p:cSld>
+    <p:spTree>
+      <p:nvGrpSpPr>
+        <p:cNvPr id="1" name=""/>
+        <p:cNvGrpSpPr/>
+        <p:nvPr/>
+      </p:nvGrpSpPr>
+      <p:grpSpPr>
+        <a:xfrm>
+          <a:off x="0" y="0"/>
+          <a:ext cx="0" cy="0"/>
+          <a:chOff x="0" y="0"/>
+          <a:chExt cx="0" cy="0"/>
+        </a:xfrm>
+      </p:grpSpPr>
+      <p:sp>
+        <p:nvSpPr>
+          <p:cNvPr id="2" name="Rectangle 1">
+            <a:extLst>
+              <a:ext uri="{FF2B5EF4-FFF2-40B4-BE49-F238E27FC236}">
+                <a16:creationId xmlns:a16="http://schemas.microsoft.com/office/drawing/2014/main" id="{127371E2-4069-EEE0-1F34-F1381DB92348}"/>
+              </a:ext>
+            </a:extLst>
+          </p:cNvPr>
+          <p:cNvSpPr/>
+          <p:nvPr/>
+        </p:nvSpPr>
+        <p:spPr>
+          <a:xfrm>
+            <a:off x="3606800" y="2015071"/>
+            <a:ext cx="550333" cy="448733"/>
+          </a:xfrm>
+          <a:prstGeom prst="rect">
+            <a:avLst/>
+          </a:prstGeom>
+        </p:spPr>
+        <p:style>
+          <a:lnRef idx="2">
+            <a:schemeClr val="accent1">
+              <a:shade val="15000"/>
+            </a:schemeClr>
+          </a:lnRef>
+          <a:fillRef idx="1">
+            <a:schemeClr val="accent1"/>
+          </a:fillRef>
+          <a:effectRef idx="0">
+            <a:schemeClr val="accent1"/>
+          </a:effectRef>
+          <a:fontRef idx="minor">
+            <a:schemeClr val="lt1"/>
+          </a:fontRef>
+        </p:style>
+        <p:txBody>
+          <a:bodyPr rtlCol="0" anchor="ctr"/>
+          <a:lstStyle/>
+          <a:p>
+            <a:pPr algn="ctr"/>
+            <a:endParaRPr lang="en-IN"/>
+          </a:p>
+        </p:txBody>
+      </p:sp>
+      <p:sp>
+        <p:nvSpPr>
+          <p:cNvPr id="3" name="Rectangle 2">
+            <a:extLst>
+              <a:ext uri="{FF2B5EF4-FFF2-40B4-BE49-F238E27FC236}">
+                <a16:creationId xmlns:a16="http://schemas.microsoft.com/office/drawing/2014/main" id="{27B2DA67-F5EE-0C72-5C56-ACBA195090D1}"/>
+              </a:ext>
+            </a:extLst>
+          </p:cNvPr>
+          <p:cNvSpPr/>
+          <p:nvPr/>
+        </p:nvSpPr>
+        <p:spPr>
+          <a:xfrm>
+            <a:off x="4923366" y="2015071"/>
+            <a:ext cx="550333" cy="448733"/>
+          </a:xfrm>
+          <a:prstGeom prst="rect">
+            <a:avLst/>
+          </a:prstGeom>
+        </p:spPr>
+        <p:style>
+          <a:lnRef idx="2">
+            <a:schemeClr val="accent1">
+              <a:shade val="15000"/>
+            </a:schemeClr>
+          </a:lnRef>
+          <a:fillRef idx="1">
+            <a:schemeClr val="accent1"/>
+          </a:fillRef>
+          <a:effectRef idx="0">
+            <a:schemeClr val="accent1"/>
+          </a:effectRef>
+          <a:fontRef idx="minor">
+            <a:schemeClr val="lt1"/>
+          </a:fontRef>
+        </p:style>
+        <p:txBody>
+          <a:bodyPr rtlCol="0" anchor="ctr"/>
+          <a:lstStyle/>
+          <a:p>
+            <a:pPr algn="ctr"/>
+            <a:endParaRPr lang="en-IN"/>
+          </a:p>
+        </p:txBody>
+      </p:sp>
+      <p:sp>
+        <p:nvSpPr>
+          <p:cNvPr id="4" name="Rectangle 3">
+            <a:extLst>
+              <a:ext uri="{FF2B5EF4-FFF2-40B4-BE49-F238E27FC236}">
+                <a16:creationId xmlns:a16="http://schemas.microsoft.com/office/drawing/2014/main" id="{91250564-578E-77B2-FDEA-09FBECCADF4A}"/>
+              </a:ext>
+            </a:extLst>
+          </p:cNvPr>
+          <p:cNvSpPr/>
+          <p:nvPr/>
+        </p:nvSpPr>
+        <p:spPr>
+          <a:xfrm>
+            <a:off x="6239933" y="2015071"/>
+            <a:ext cx="550333" cy="448733"/>
+          </a:xfrm>
+          <a:prstGeom prst="rect">
+            <a:avLst/>
+          </a:prstGeom>
+        </p:spPr>
+        <p:style>
+          <a:lnRef idx="2">
+            <a:schemeClr val="accent1">
+              <a:shade val="15000"/>
+            </a:schemeClr>
+          </a:lnRef>
+          <a:fillRef idx="1">
+            <a:schemeClr val="accent1"/>
+          </a:fillRef>
+          <a:effectRef idx="0">
+            <a:schemeClr val="accent1"/>
+          </a:effectRef>
+          <a:fontRef idx="minor">
+            <a:schemeClr val="lt1"/>
+          </a:fontRef>
+        </p:style>
+        <p:txBody>
+          <a:bodyPr rtlCol="0" anchor="ctr"/>
+          <a:lstStyle/>
+          <a:p>
+            <a:pPr algn="ctr"/>
+            <a:endParaRPr lang="en-IN"/>
+          </a:p>
+        </p:txBody>
+      </p:sp>
+      <p:sp>
+        <p:nvSpPr>
+          <p:cNvPr id="5" name="TextBox 4">
+            <a:extLst>
+              <a:ext uri="{FF2B5EF4-FFF2-40B4-BE49-F238E27FC236}">
+                <a16:creationId xmlns:a16="http://schemas.microsoft.com/office/drawing/2014/main" id="{726E3C34-B478-6B1A-90CB-1C5091553620}"/>
+              </a:ext>
+            </a:extLst>
+          </p:cNvPr>
+          <p:cNvSpPr txBox="1"/>
+          <p:nvPr/>
+        </p:nvSpPr>
+        <p:spPr>
+          <a:xfrm>
+            <a:off x="4400304" y="1969240"/>
+            <a:ext cx="300082" cy="646331"/>
+          </a:xfrm>
+          <a:prstGeom prst="rect">
+            <a:avLst/>
+          </a:prstGeom>
+          <a:noFill/>
+        </p:spPr>
+        <p:txBody>
+          <a:bodyPr wrap="none" rtlCol="0">
+            <a:spAutoFit/>
+          </a:bodyPr>
+          <a:lstStyle/>
+          <a:p>
+            <a:r>
+              <a:rPr lang="en-IN" sz="3600" dirty="0"/>
+              <a:t>,</a:t>
+            </a:r>
+          </a:p>
+        </p:txBody>
+      </p:sp>
+      <p:sp>
+        <p:nvSpPr>
+          <p:cNvPr id="6" name="TextBox 5">
+            <a:extLst>
+              <a:ext uri="{FF2B5EF4-FFF2-40B4-BE49-F238E27FC236}">
+                <a16:creationId xmlns:a16="http://schemas.microsoft.com/office/drawing/2014/main" id="{F086B032-3CB3-FA57-C1ED-6BE0BBEF4CA2}"/>
+              </a:ext>
+            </a:extLst>
+          </p:cNvPr>
+          <p:cNvSpPr txBox="1"/>
+          <p:nvPr/>
+        </p:nvSpPr>
+        <p:spPr>
+          <a:xfrm>
+            <a:off x="5740642" y="2010541"/>
+            <a:ext cx="300082" cy="646331"/>
+          </a:xfrm>
+          <a:prstGeom prst="rect">
+            <a:avLst/>
+          </a:prstGeom>
+          <a:noFill/>
+        </p:spPr>
+        <p:txBody>
+          <a:bodyPr wrap="none" rtlCol="0">
+            <a:spAutoFit/>
+          </a:bodyPr>
+          <a:lstStyle/>
+          <a:p>
+            <a:r>
+              <a:rPr lang="en-IN" sz="3600" dirty="0"/>
+              <a:t>,</a:t>
+            </a:r>
+            <a:endParaRPr lang="en-IN" dirty="0"/>
+          </a:p>
+        </p:txBody>
+      </p:sp>
+      <p:sp>
+        <p:nvSpPr>
+          <p:cNvPr id="7" name="TextBox 6">
+            <a:extLst>
+              <a:ext uri="{FF2B5EF4-FFF2-40B4-BE49-F238E27FC236}">
+                <a16:creationId xmlns:a16="http://schemas.microsoft.com/office/drawing/2014/main" id="{3DC94FBB-5369-6887-C548-3930BA30CA05}"/>
+              </a:ext>
+            </a:extLst>
+          </p:cNvPr>
+          <p:cNvSpPr txBox="1"/>
+          <p:nvPr/>
+        </p:nvSpPr>
+        <p:spPr>
+          <a:xfrm>
+            <a:off x="3137280" y="1911007"/>
+            <a:ext cx="324128" cy="646331"/>
+          </a:xfrm>
+          <a:prstGeom prst="rect">
+            <a:avLst/>
+          </a:prstGeom>
+          <a:noFill/>
+        </p:spPr>
+        <p:txBody>
+          <a:bodyPr wrap="none" rtlCol="0">
+            <a:spAutoFit/>
+          </a:bodyPr>
+          <a:lstStyle/>
+          <a:p>
+            <a:r>
+              <a:rPr lang="en-IN" sz="3600" dirty="0"/>
+              <a:t>(</a:t>
+            </a:r>
+          </a:p>
+        </p:txBody>
+      </p:sp>
+      <p:sp>
+        <p:nvSpPr>
+          <p:cNvPr id="8" name="TextBox 7">
+            <a:extLst>
+              <a:ext uri="{FF2B5EF4-FFF2-40B4-BE49-F238E27FC236}">
+                <a16:creationId xmlns:a16="http://schemas.microsoft.com/office/drawing/2014/main" id="{97ABEF81-7D7A-EF25-1740-B27F8EFA4FFC}"/>
+              </a:ext>
+            </a:extLst>
+          </p:cNvPr>
+          <p:cNvSpPr txBox="1"/>
+          <p:nvPr/>
+        </p:nvSpPr>
+        <p:spPr>
+          <a:xfrm>
+            <a:off x="7023342" y="1911006"/>
+            <a:ext cx="324128" cy="646331"/>
+          </a:xfrm>
+          <a:prstGeom prst="rect">
+            <a:avLst/>
+          </a:prstGeom>
+          <a:noFill/>
+        </p:spPr>
+        <p:txBody>
+          <a:bodyPr wrap="none" rtlCol="0">
+            <a:spAutoFit/>
+          </a:bodyPr>
+          <a:lstStyle/>
+          <a:p>
+            <a:r>
+              <a:rPr lang="en-IN" sz="3600" dirty="0"/>
+              <a:t>)</a:t>
+            </a:r>
+          </a:p>
+        </p:txBody>
+      </p:sp>
+      <p:sp>
+        <p:nvSpPr>
+          <p:cNvPr id="9" name="TextBox 8">
+            <a:extLst>
+              <a:ext uri="{FF2B5EF4-FFF2-40B4-BE49-F238E27FC236}">
+                <a16:creationId xmlns:a16="http://schemas.microsoft.com/office/drawing/2014/main" id="{24DD0471-1121-5A73-3770-153C77F362BE}"/>
+              </a:ext>
+            </a:extLst>
+          </p:cNvPr>
+          <p:cNvSpPr txBox="1"/>
+          <p:nvPr/>
+        </p:nvSpPr>
+        <p:spPr>
+          <a:xfrm>
+            <a:off x="2685185" y="1893040"/>
+            <a:ext cx="325730" cy="646331"/>
+          </a:xfrm>
+          <a:prstGeom prst="rect">
+            <a:avLst/>
+          </a:prstGeom>
+          <a:noFill/>
+        </p:spPr>
+        <p:txBody>
+          <a:bodyPr wrap="none" rtlCol="0">
+            <a:spAutoFit/>
+          </a:bodyPr>
+          <a:lstStyle/>
+          <a:p>
+            <a:r>
+              <a:rPr lang="en-IN" sz="3600" i="1" dirty="0"/>
+              <a:t>f</a:t>
+            </a:r>
+          </a:p>
+        </p:txBody>
+      </p:sp>
+      <p:sp>
+        <p:nvSpPr>
+          <p:cNvPr id="10" name="TextBox 9">
+            <a:extLst>
+              <a:ext uri="{FF2B5EF4-FFF2-40B4-BE49-F238E27FC236}">
+                <a16:creationId xmlns:a16="http://schemas.microsoft.com/office/drawing/2014/main" id="{E56AD068-37FB-DAD0-AB04-2FA87AC03177}"/>
+              </a:ext>
+            </a:extLst>
+          </p:cNvPr>
+          <p:cNvSpPr txBox="1"/>
+          <p:nvPr/>
+        </p:nvSpPr>
+        <p:spPr>
+          <a:xfrm>
+            <a:off x="3238771" y="3275971"/>
+            <a:ext cx="1285929" cy="646331"/>
+          </a:xfrm>
+          <a:prstGeom prst="rect">
+            <a:avLst/>
+          </a:prstGeom>
+          <a:noFill/>
+        </p:spPr>
+        <p:txBody>
+          <a:bodyPr wrap="none" rtlCol="0">
+            <a:spAutoFit/>
+          </a:bodyPr>
+          <a:lstStyle/>
+          <a:p>
+            <a:r>
+              <a:rPr lang="en-IN" sz="3600" i="1" dirty="0"/>
+              <a:t>g1(…)</a:t>
+            </a:r>
+          </a:p>
+        </p:txBody>
+      </p:sp>
+      <p:sp>
+        <p:nvSpPr>
+          <p:cNvPr id="11" name="TextBox 10">
+            <a:extLst>
+              <a:ext uri="{FF2B5EF4-FFF2-40B4-BE49-F238E27FC236}">
+                <a16:creationId xmlns:a16="http://schemas.microsoft.com/office/drawing/2014/main" id="{7ED059C2-EF4D-461B-95B3-BC146426BBF8}"/>
+              </a:ext>
+            </a:extLst>
+          </p:cNvPr>
+          <p:cNvSpPr txBox="1"/>
+          <p:nvPr/>
+        </p:nvSpPr>
+        <p:spPr>
+          <a:xfrm>
+            <a:off x="4591565" y="3291639"/>
+            <a:ext cx="1253869" cy="646331"/>
+          </a:xfrm>
+          <a:prstGeom prst="rect">
+            <a:avLst/>
+          </a:prstGeom>
+          <a:noFill/>
+        </p:spPr>
+        <p:txBody>
+          <a:bodyPr wrap="none" rtlCol="0">
+            <a:spAutoFit/>
+          </a:bodyPr>
+          <a:lstStyle/>
+          <a:p>
+            <a:r>
+              <a:rPr lang="en-IN" sz="3600" i="1" dirty="0"/>
+              <a:t>g2(…)</a:t>
+            </a:r>
+          </a:p>
+        </p:txBody>
+      </p:sp>
+      <p:sp>
+        <p:nvSpPr>
+          <p:cNvPr id="12" name="TextBox 11">
+            <a:extLst>
+              <a:ext uri="{FF2B5EF4-FFF2-40B4-BE49-F238E27FC236}">
+                <a16:creationId xmlns:a16="http://schemas.microsoft.com/office/drawing/2014/main" id="{F4E0B4EF-4031-DA42-2AE4-EC00DC1DB8AE}"/>
+              </a:ext>
+            </a:extLst>
+          </p:cNvPr>
+          <p:cNvSpPr txBox="1"/>
+          <p:nvPr/>
+        </p:nvSpPr>
+        <p:spPr>
+          <a:xfrm>
+            <a:off x="5914603" y="3313476"/>
+            <a:ext cx="1253869" cy="646331"/>
+          </a:xfrm>
+          <a:prstGeom prst="rect">
+            <a:avLst/>
+          </a:prstGeom>
+          <a:noFill/>
+        </p:spPr>
+        <p:txBody>
+          <a:bodyPr wrap="none" rtlCol="0">
+            <a:spAutoFit/>
+          </a:bodyPr>
+          <a:lstStyle/>
+          <a:p>
+            <a:r>
+              <a:rPr lang="en-IN" sz="3600" i="1" dirty="0"/>
+              <a:t>g3(…)</a:t>
+            </a:r>
+          </a:p>
+        </p:txBody>
+      </p:sp>
+      <p:sp>
+        <p:nvSpPr>
+          <p:cNvPr id="13" name="TextBox 12">
+            <a:extLst>
+              <a:ext uri="{FF2B5EF4-FFF2-40B4-BE49-F238E27FC236}">
+                <a16:creationId xmlns:a16="http://schemas.microsoft.com/office/drawing/2014/main" id="{02E0EF1E-79B3-4D31-8A2E-EA71F585E798}"/>
+              </a:ext>
+            </a:extLst>
+          </p:cNvPr>
+          <p:cNvSpPr txBox="1"/>
+          <p:nvPr/>
+        </p:nvSpPr>
+        <p:spPr>
+          <a:xfrm>
+            <a:off x="2414052" y="4582702"/>
+            <a:ext cx="1193725" cy="646331"/>
+          </a:xfrm>
+          <a:prstGeom prst="rect">
+            <a:avLst/>
+          </a:prstGeom>
+          <a:noFill/>
+        </p:spPr>
+        <p:txBody>
+          <a:bodyPr wrap="none" rtlCol="0">
+            <a:spAutoFit/>
+          </a:bodyPr>
+          <a:lstStyle/>
+          <a:p>
+            <a:r>
+              <a:rPr lang="en-IN" i="1" dirty="0"/>
+              <a:t>Linear </a:t>
+            </a:r>
+          </a:p>
+          <a:p>
+            <a:r>
+              <a:rPr lang="en-IN" i="1" dirty="0"/>
+              <a:t>Regression</a:t>
+            </a:r>
+          </a:p>
+        </p:txBody>
+      </p:sp>
+      <p:sp>
+        <p:nvSpPr>
+          <p:cNvPr id="14" name="TextBox 13">
+            <a:extLst>
+              <a:ext uri="{FF2B5EF4-FFF2-40B4-BE49-F238E27FC236}">
+                <a16:creationId xmlns:a16="http://schemas.microsoft.com/office/drawing/2014/main" id="{C7953F3C-1EB9-2B8C-5E0E-0FE1D04E9905}"/>
+              </a:ext>
+            </a:extLst>
+          </p:cNvPr>
+          <p:cNvSpPr txBox="1"/>
+          <p:nvPr/>
+        </p:nvSpPr>
+        <p:spPr>
+          <a:xfrm>
+            <a:off x="4638571" y="5229032"/>
+            <a:ext cx="1193725" cy="646331"/>
+          </a:xfrm>
+          <a:prstGeom prst="rect">
+            <a:avLst/>
+          </a:prstGeom>
+          <a:noFill/>
+        </p:spPr>
+        <p:txBody>
+          <a:bodyPr wrap="none" rtlCol="0">
+            <a:spAutoFit/>
+          </a:bodyPr>
+          <a:lstStyle/>
+          <a:p>
+            <a:r>
+              <a:rPr lang="en-IN" i="1" dirty="0"/>
+              <a:t>Linear </a:t>
+            </a:r>
+          </a:p>
+          <a:p>
+            <a:r>
+              <a:rPr lang="en-IN" i="1" dirty="0"/>
+              <a:t>Regression</a:t>
+            </a:r>
+          </a:p>
+        </p:txBody>
+      </p:sp>
+      <p:sp>
+        <p:nvSpPr>
+          <p:cNvPr id="15" name="TextBox 14">
+            <a:extLst>
+              <a:ext uri="{FF2B5EF4-FFF2-40B4-BE49-F238E27FC236}">
+                <a16:creationId xmlns:a16="http://schemas.microsoft.com/office/drawing/2014/main" id="{3E520785-2D65-85AE-3F28-C6558E6A195B}"/>
+              </a:ext>
+            </a:extLst>
+          </p:cNvPr>
+          <p:cNvSpPr txBox="1"/>
+          <p:nvPr/>
+        </p:nvSpPr>
+        <p:spPr>
+          <a:xfrm>
+            <a:off x="6588543" y="4582701"/>
+            <a:ext cx="1699889" cy="646331"/>
+          </a:xfrm>
+          <a:prstGeom prst="rect">
+            <a:avLst/>
+          </a:prstGeom>
+          <a:noFill/>
+        </p:spPr>
+        <p:txBody>
+          <a:bodyPr wrap="none" rtlCol="0">
+            <a:spAutoFit/>
+          </a:bodyPr>
+          <a:lstStyle/>
+          <a:p>
+            <a:r>
+              <a:rPr lang="en-IN" i="1" dirty="0"/>
+              <a:t>Random Forest </a:t>
+            </a:r>
+          </a:p>
+          <a:p>
+            <a:r>
+              <a:rPr lang="en-IN" i="1" dirty="0"/>
+              <a:t>Regression</a:t>
+            </a:r>
+          </a:p>
+        </p:txBody>
+      </p:sp>
+      <p:cxnSp>
+        <p:nvCxnSpPr>
+          <p:cNvPr id="16" name="Straight Arrow Connector 15">
+            <a:extLst>
+              <a:ext uri="{FF2B5EF4-FFF2-40B4-BE49-F238E27FC236}">
+                <a16:creationId xmlns:a16="http://schemas.microsoft.com/office/drawing/2014/main" id="{CA75A72B-AD84-764A-4259-649A32440EE2}"/>
+              </a:ext>
+            </a:extLst>
+          </p:cNvPr>
+          <p:cNvCxnSpPr>
+            <a:cxnSpLocks/>
+            <a:endCxn id="10" idx="2"/>
+          </p:cNvCxnSpPr>
+          <p:nvPr/>
+        </p:nvCxnSpPr>
+        <p:spPr>
+          <a:xfrm flipV="1">
+            <a:off x="2797248" y="3922302"/>
+            <a:ext cx="1084488" cy="634767"/>
+          </a:xfrm>
+          <a:prstGeom prst="straightConnector1">
+            <a:avLst/>
+          </a:prstGeom>
+          <a:ln>
+            <a:solidFill>
+              <a:schemeClr val="tx1"/>
+            </a:solidFill>
+            <a:tailEnd type="triangle"/>
+          </a:ln>
+        </p:spPr>
+        <p:style>
+          <a:lnRef idx="1">
+            <a:schemeClr val="accent1"/>
+          </a:lnRef>
+          <a:fillRef idx="0">
+            <a:schemeClr val="accent1"/>
+          </a:fillRef>
+          <a:effectRef idx="0">
+            <a:schemeClr val="accent1"/>
+          </a:effectRef>
+          <a:fontRef idx="minor">
+            <a:schemeClr val="tx1"/>
+          </a:fontRef>
+        </p:style>
+      </p:cxnSp>
+      <p:cxnSp>
+        <p:nvCxnSpPr>
+          <p:cNvPr id="17" name="Straight Arrow Connector 16">
+            <a:extLst>
+              <a:ext uri="{FF2B5EF4-FFF2-40B4-BE49-F238E27FC236}">
+                <a16:creationId xmlns:a16="http://schemas.microsoft.com/office/drawing/2014/main" id="{B8E9E2F4-29A8-F2C1-1034-E8D0059E1084}"/>
+              </a:ext>
+            </a:extLst>
+          </p:cNvPr>
+          <p:cNvCxnSpPr>
+            <a:cxnSpLocks/>
+            <a:stCxn id="14" idx="0"/>
+            <a:endCxn id="11" idx="2"/>
+          </p:cNvCxnSpPr>
+          <p:nvPr/>
+        </p:nvCxnSpPr>
+        <p:spPr>
+          <a:xfrm flipH="1" flipV="1">
+            <a:off x="5218500" y="3937970"/>
+            <a:ext cx="16934" cy="1291062"/>
+          </a:xfrm>
+          <a:prstGeom prst="straightConnector1">
+            <a:avLst/>
+          </a:prstGeom>
+          <a:ln>
+            <a:solidFill>
+              <a:schemeClr val="tx1"/>
+            </a:solidFill>
+            <a:tailEnd type="triangle"/>
+          </a:ln>
+        </p:spPr>
+        <p:style>
+          <a:lnRef idx="1">
+            <a:schemeClr val="accent1"/>
+          </a:lnRef>
+          <a:fillRef idx="0">
+            <a:schemeClr val="accent1"/>
+          </a:fillRef>
+          <a:effectRef idx="0">
+            <a:schemeClr val="accent1"/>
+          </a:effectRef>
+          <a:fontRef idx="minor">
+            <a:schemeClr val="tx1"/>
+          </a:fontRef>
+        </p:style>
+      </p:cxnSp>
+      <p:cxnSp>
+        <p:nvCxnSpPr>
+          <p:cNvPr id="18" name="Straight Arrow Connector 17">
+            <a:extLst>
+              <a:ext uri="{FF2B5EF4-FFF2-40B4-BE49-F238E27FC236}">
+                <a16:creationId xmlns:a16="http://schemas.microsoft.com/office/drawing/2014/main" id="{061E24D3-433B-59E0-2074-FE24CEE88F62}"/>
+              </a:ext>
+            </a:extLst>
+          </p:cNvPr>
+          <p:cNvCxnSpPr>
+            <a:cxnSpLocks/>
+            <a:stCxn id="15" idx="0"/>
+            <a:endCxn id="12" idx="2"/>
+          </p:cNvCxnSpPr>
+          <p:nvPr/>
+        </p:nvCxnSpPr>
+        <p:spPr>
+          <a:xfrm flipH="1" flipV="1">
+            <a:off x="6541538" y="3959807"/>
+            <a:ext cx="896950" cy="622894"/>
+          </a:xfrm>
+          <a:prstGeom prst="straightConnector1">
+            <a:avLst/>
+          </a:prstGeom>
+          <a:ln>
+            <a:solidFill>
+              <a:schemeClr val="tx1"/>
+            </a:solidFill>
+            <a:tailEnd type="triangle"/>
+          </a:ln>
+        </p:spPr>
+        <p:style>
+          <a:lnRef idx="1">
+            <a:schemeClr val="accent1"/>
+          </a:lnRef>
+          <a:fillRef idx="0">
+            <a:schemeClr val="accent1"/>
+          </a:fillRef>
+          <a:effectRef idx="0">
+            <a:schemeClr val="accent1"/>
+          </a:effectRef>
+          <a:fontRef idx="minor">
+            <a:schemeClr val="tx1"/>
+          </a:fontRef>
+        </p:style>
+      </p:cxnSp>
+      <p:sp>
+        <p:nvSpPr>
+          <p:cNvPr id="19" name="TextBox 18">
+            <a:extLst>
+              <a:ext uri="{FF2B5EF4-FFF2-40B4-BE49-F238E27FC236}">
+                <a16:creationId xmlns:a16="http://schemas.microsoft.com/office/drawing/2014/main" id="{C8C579C6-4A59-884D-56F2-50244A5AA0D6}"/>
+              </a:ext>
+            </a:extLst>
+          </p:cNvPr>
+          <p:cNvSpPr txBox="1"/>
+          <p:nvPr/>
+        </p:nvSpPr>
+        <p:spPr>
+          <a:xfrm>
+            <a:off x="1041113" y="4582701"/>
+            <a:ext cx="1552156" cy="369332"/>
+          </a:xfrm>
+          <a:prstGeom prst="rect">
+            <a:avLst/>
+          </a:prstGeom>
+          <a:noFill/>
+        </p:spPr>
+        <p:txBody>
+          <a:bodyPr wrap="none" rtlCol="0">
+            <a:spAutoFit/>
+          </a:bodyPr>
+          <a:lstStyle/>
+          <a:p>
+            <a:r>
+              <a:rPr lang="en-IN" i="1" dirty="0"/>
+              <a:t>Space heating </a:t>
+            </a:r>
+          </a:p>
+        </p:txBody>
+      </p:sp>
+      <p:sp>
+        <p:nvSpPr>
+          <p:cNvPr id="20" name="TextBox 19">
+            <a:extLst>
+              <a:ext uri="{FF2B5EF4-FFF2-40B4-BE49-F238E27FC236}">
+                <a16:creationId xmlns:a16="http://schemas.microsoft.com/office/drawing/2014/main" id="{CF355F1D-8F16-EF53-C849-9DD9704F7FD6}"/>
+              </a:ext>
+            </a:extLst>
+          </p:cNvPr>
+          <p:cNvSpPr txBox="1"/>
+          <p:nvPr/>
+        </p:nvSpPr>
+        <p:spPr>
+          <a:xfrm>
+            <a:off x="2840969" y="5367531"/>
+            <a:ext cx="1873270" cy="369332"/>
+          </a:xfrm>
+          <a:prstGeom prst="rect">
+            <a:avLst/>
+          </a:prstGeom>
+          <a:noFill/>
+        </p:spPr>
+        <p:txBody>
+          <a:bodyPr wrap="none" rtlCol="0">
+            <a:spAutoFit/>
+          </a:bodyPr>
+          <a:lstStyle/>
+          <a:p>
+            <a:r>
+              <a:rPr lang="en-IN" i="1" dirty="0"/>
+              <a:t>Comms &amp; services</a:t>
+            </a:r>
+          </a:p>
+        </p:txBody>
+      </p:sp>
+      <p:sp>
+        <p:nvSpPr>
+          <p:cNvPr id="21" name="TextBox 20">
+            <a:extLst>
+              <a:ext uri="{FF2B5EF4-FFF2-40B4-BE49-F238E27FC236}">
+                <a16:creationId xmlns:a16="http://schemas.microsoft.com/office/drawing/2014/main" id="{4B3CD81E-9270-C547-EFB3-7BFA565889BD}"/>
+              </a:ext>
+            </a:extLst>
+          </p:cNvPr>
+          <p:cNvSpPr txBox="1"/>
+          <p:nvPr/>
+        </p:nvSpPr>
+        <p:spPr>
+          <a:xfrm>
+            <a:off x="6601191" y="5229032"/>
+            <a:ext cx="3005118" cy="369332"/>
+          </a:xfrm>
+          <a:prstGeom prst="rect">
+            <a:avLst/>
+          </a:prstGeom>
+          <a:noFill/>
+        </p:spPr>
+        <p:txBody>
+          <a:bodyPr wrap="none" rtlCol="0">
+            <a:spAutoFit/>
+          </a:bodyPr>
+          <a:lstStyle/>
+          <a:p>
+            <a:r>
+              <a:rPr lang="en-IN" i="1" dirty="0"/>
+              <a:t>Hot water + lighting + sockets</a:t>
+            </a:r>
+          </a:p>
+        </p:txBody>
+      </p:sp>
+      <p:cxnSp>
+        <p:nvCxnSpPr>
+          <p:cNvPr id="22" name="Straight Arrow Connector 21">
+            <a:extLst>
+              <a:ext uri="{FF2B5EF4-FFF2-40B4-BE49-F238E27FC236}">
+                <a16:creationId xmlns:a16="http://schemas.microsoft.com/office/drawing/2014/main" id="{76B59ADF-B359-4AD3-241C-4596437D0091}"/>
+              </a:ext>
+            </a:extLst>
+          </p:cNvPr>
+          <p:cNvCxnSpPr>
+            <a:cxnSpLocks/>
+            <a:stCxn id="3" idx="0"/>
+          </p:cNvCxnSpPr>
+          <p:nvPr/>
+        </p:nvCxnSpPr>
+        <p:spPr>
+          <a:xfrm flipV="1">
+            <a:off x="5198533" y="982637"/>
+            <a:ext cx="0" cy="1032434"/>
+          </a:xfrm>
+          <a:prstGeom prst="straightConnector1">
+            <a:avLst/>
+          </a:prstGeom>
+          <a:ln>
+            <a:solidFill>
+              <a:schemeClr val="tx1"/>
+            </a:solidFill>
+            <a:tailEnd type="triangle"/>
+          </a:ln>
+        </p:spPr>
+        <p:style>
+          <a:lnRef idx="1">
+            <a:schemeClr val="accent1"/>
+          </a:lnRef>
+          <a:fillRef idx="0">
+            <a:schemeClr val="accent1"/>
+          </a:fillRef>
+          <a:effectRef idx="0">
+            <a:schemeClr val="accent1"/>
+          </a:effectRef>
+          <a:fontRef idx="minor">
+            <a:schemeClr val="tx1"/>
+          </a:fontRef>
+        </p:style>
+      </p:cxnSp>
+      <p:cxnSp>
+        <p:nvCxnSpPr>
+          <p:cNvPr id="23" name="Straight Arrow Connector 22">
+            <a:extLst>
+              <a:ext uri="{FF2B5EF4-FFF2-40B4-BE49-F238E27FC236}">
+                <a16:creationId xmlns:a16="http://schemas.microsoft.com/office/drawing/2014/main" id="{362F051E-7993-BC92-3D65-B2A3B8FFC01E}"/>
+              </a:ext>
+            </a:extLst>
+          </p:cNvPr>
+          <p:cNvCxnSpPr>
+            <a:cxnSpLocks/>
+            <a:stCxn id="10" idx="0"/>
+            <a:endCxn id="2" idx="2"/>
+          </p:cNvCxnSpPr>
+          <p:nvPr/>
+        </p:nvCxnSpPr>
+        <p:spPr>
+          <a:xfrm flipV="1">
+            <a:off x="3881736" y="2463804"/>
+            <a:ext cx="231" cy="812167"/>
+          </a:xfrm>
+          <a:prstGeom prst="straightConnector1">
+            <a:avLst/>
+          </a:prstGeom>
+          <a:ln>
+            <a:solidFill>
+              <a:schemeClr val="tx1"/>
+            </a:solidFill>
+            <a:tailEnd type="triangle"/>
+          </a:ln>
+        </p:spPr>
+        <p:style>
+          <a:lnRef idx="1">
+            <a:schemeClr val="accent1"/>
+          </a:lnRef>
+          <a:fillRef idx="0">
+            <a:schemeClr val="accent1"/>
+          </a:fillRef>
+          <a:effectRef idx="0">
+            <a:schemeClr val="accent1"/>
+          </a:effectRef>
+          <a:fontRef idx="minor">
+            <a:schemeClr val="tx1"/>
+          </a:fontRef>
+        </p:style>
+      </p:cxnSp>
+      <p:cxnSp>
+        <p:nvCxnSpPr>
+          <p:cNvPr id="24" name="Straight Arrow Connector 23">
+            <a:extLst>
+              <a:ext uri="{FF2B5EF4-FFF2-40B4-BE49-F238E27FC236}">
+                <a16:creationId xmlns:a16="http://schemas.microsoft.com/office/drawing/2014/main" id="{C29676B5-2511-1EB7-2A59-9B436540D346}"/>
+              </a:ext>
+            </a:extLst>
+          </p:cNvPr>
+          <p:cNvCxnSpPr>
+            <a:cxnSpLocks/>
+            <a:stCxn id="11" idx="0"/>
+            <a:endCxn id="3" idx="2"/>
+          </p:cNvCxnSpPr>
+          <p:nvPr/>
+        </p:nvCxnSpPr>
+        <p:spPr>
+          <a:xfrm flipH="1" flipV="1">
+            <a:off x="5198533" y="2463804"/>
+            <a:ext cx="19967" cy="827835"/>
+          </a:xfrm>
+          <a:prstGeom prst="straightConnector1">
+            <a:avLst/>
+          </a:prstGeom>
+          <a:ln>
+            <a:solidFill>
+              <a:schemeClr val="tx1"/>
+            </a:solidFill>
+            <a:tailEnd type="triangle"/>
+          </a:ln>
+        </p:spPr>
+        <p:style>
+          <a:lnRef idx="1">
+            <a:schemeClr val="accent1"/>
+          </a:lnRef>
+          <a:fillRef idx="0">
+            <a:schemeClr val="accent1"/>
+          </a:fillRef>
+          <a:effectRef idx="0">
+            <a:schemeClr val="accent1"/>
+          </a:effectRef>
+          <a:fontRef idx="minor">
+            <a:schemeClr val="tx1"/>
+          </a:fontRef>
+        </p:style>
+      </p:cxnSp>
+      <p:cxnSp>
+        <p:nvCxnSpPr>
+          <p:cNvPr id="25" name="Straight Arrow Connector 24">
+            <a:extLst>
+              <a:ext uri="{FF2B5EF4-FFF2-40B4-BE49-F238E27FC236}">
+                <a16:creationId xmlns:a16="http://schemas.microsoft.com/office/drawing/2014/main" id="{9D56F767-4358-21FB-D9E2-103B58E8CC4A}"/>
+              </a:ext>
+            </a:extLst>
+          </p:cNvPr>
+          <p:cNvCxnSpPr>
+            <a:cxnSpLocks/>
+            <a:stCxn id="12" idx="0"/>
+            <a:endCxn id="4" idx="2"/>
+          </p:cNvCxnSpPr>
+          <p:nvPr/>
+        </p:nvCxnSpPr>
+        <p:spPr>
+          <a:xfrm flipH="1" flipV="1">
+            <a:off x="6515100" y="2463804"/>
+            <a:ext cx="26438" cy="849672"/>
+          </a:xfrm>
+          <a:prstGeom prst="straightConnector1">
+            <a:avLst/>
+          </a:prstGeom>
+          <a:ln>
+            <a:solidFill>
+              <a:schemeClr val="tx1"/>
+            </a:solidFill>
+            <a:tailEnd type="triangle"/>
+          </a:ln>
+        </p:spPr>
+        <p:style>
+          <a:lnRef idx="1">
+            <a:schemeClr val="accent1"/>
+          </a:lnRef>
+          <a:fillRef idx="0">
+            <a:schemeClr val="accent1"/>
+          </a:fillRef>
+          <a:effectRef idx="0">
+            <a:schemeClr val="accent1"/>
+          </a:effectRef>
+          <a:fontRef idx="minor">
+            <a:schemeClr val="tx1"/>
+          </a:fontRef>
+        </p:style>
+      </p:cxnSp>
+      <p:sp>
+        <p:nvSpPr>
+          <p:cNvPr id="26" name="TextBox 25">
+            <a:extLst>
+              <a:ext uri="{FF2B5EF4-FFF2-40B4-BE49-F238E27FC236}">
+                <a16:creationId xmlns:a16="http://schemas.microsoft.com/office/drawing/2014/main" id="{55126798-4FF4-05AA-F017-1680E222D122}"/>
+              </a:ext>
+            </a:extLst>
+          </p:cNvPr>
+          <p:cNvSpPr txBox="1"/>
+          <p:nvPr/>
+        </p:nvSpPr>
+        <p:spPr>
+          <a:xfrm>
+            <a:off x="3010914" y="483549"/>
+            <a:ext cx="4714945" cy="369332"/>
+          </a:xfrm>
+          <a:prstGeom prst="rect">
+            <a:avLst/>
+          </a:prstGeom>
+          <a:noFill/>
+        </p:spPr>
+        <p:txBody>
+          <a:bodyPr wrap="none" rtlCol="0">
+            <a:spAutoFit/>
+          </a:bodyPr>
+          <a:lstStyle/>
+          <a:p>
+            <a:r>
+              <a:rPr lang="en-IN" i="1" dirty="0"/>
+              <a:t>Building energy consumption composite forecast</a:t>
+            </a:r>
+          </a:p>
+        </p:txBody>
+      </p:sp>
+      <p:sp>
+        <p:nvSpPr>
+          <p:cNvPr id="27" name="TextBox 26">
+            <a:extLst>
+              <a:ext uri="{FF2B5EF4-FFF2-40B4-BE49-F238E27FC236}">
+                <a16:creationId xmlns:a16="http://schemas.microsoft.com/office/drawing/2014/main" id="{0C733E1F-1AD8-B175-D09D-97F6F415443A}"/>
+              </a:ext>
+            </a:extLst>
+          </p:cNvPr>
+          <p:cNvSpPr txBox="1"/>
+          <p:nvPr/>
+        </p:nvSpPr>
+        <p:spPr>
+          <a:xfrm>
+            <a:off x="7984066" y="2010541"/>
+            <a:ext cx="2027414" cy="369332"/>
+          </a:xfrm>
+          <a:prstGeom prst="rect">
+            <a:avLst/>
+          </a:prstGeom>
+          <a:noFill/>
+        </p:spPr>
+        <p:txBody>
+          <a:bodyPr wrap="none" rtlCol="0">
+            <a:spAutoFit/>
+          </a:bodyPr>
+          <a:lstStyle/>
+          <a:p>
+            <a:r>
+              <a:rPr lang="en-IN" i="1" dirty="0"/>
+              <a:t>Composite Function</a:t>
+            </a:r>
+          </a:p>
+        </p:txBody>
+      </p:sp>
+      <p:sp>
+        <p:nvSpPr>
+          <p:cNvPr id="28" name="TextBox 27">
+            <a:extLst>
+              <a:ext uri="{FF2B5EF4-FFF2-40B4-BE49-F238E27FC236}">
+                <a16:creationId xmlns:a16="http://schemas.microsoft.com/office/drawing/2014/main" id="{A7FC7BB2-37F0-0894-55FD-119D172D301C}"/>
+              </a:ext>
+            </a:extLst>
+          </p:cNvPr>
+          <p:cNvSpPr txBox="1"/>
+          <p:nvPr/>
+        </p:nvSpPr>
+        <p:spPr>
+          <a:xfrm>
+            <a:off x="8768191" y="3429000"/>
+            <a:ext cx="2486578" cy="369332"/>
+          </a:xfrm>
+          <a:prstGeom prst="rect">
+            <a:avLst/>
+          </a:prstGeom>
+          <a:noFill/>
+        </p:spPr>
+        <p:txBody>
+          <a:bodyPr wrap="none" rtlCol="0">
+            <a:spAutoFit/>
+          </a:bodyPr>
+          <a:lstStyle/>
+          <a:p>
+            <a:r>
+              <a:rPr lang="en-IN" i="1" dirty="0"/>
+              <a:t>Individual Circuit Models</a:t>
+            </a:r>
+          </a:p>
+        </p:txBody>
+      </p:sp>
+    </p:spTree>
+    <p:extLst>
+      <p:ext uri="{BB962C8B-B14F-4D97-AF65-F5344CB8AC3E}">
+        <p14:creationId xmlns:p14="http://schemas.microsoft.com/office/powerpoint/2010/main" val="2773513554"/>
+      </p:ext>
+    </p:extLst>
+  </p:cSld>
+  <p:clrMapOvr>
+    <a:masterClrMapping/>
+  </p:clrMapOvr>
+</p:sld>
+</file>
+
 <file path=ppt/theme/theme1.xml><?xml version="1.0" encoding="utf-8"?>
 <a:theme xmlns:a="http://schemas.openxmlformats.org/drawingml/2006/main" name="Office Theme">
   <a:themeElements>

</xml_diff>